<commit_message>
dapr1 - week 11 - draft almost complete
</commit_message>
<xml_diff>
--- a/dapr1/dapr1book/images/statistical_inference.pptx
+++ b/dapr1/dapr1book/images/statistical_inference.pptx
@@ -104,6 +104,11 @@
       </a:defRPr>
     </a:lvl9pPr>
   </p:defaultTextStyle>
+  <p:extLst>
+    <p:ext uri="{EFAFB233-063F-42B5-8137-9DF3F51BA10A}">
+      <p15:sldGuideLst xmlns:p15="http://schemas.microsoft.com/office/powerpoint/2012/main"/>
+    </p:ext>
+  </p:extLst>
 </p:presentation>
 </file>
 
@@ -238,7 +243,7 @@
           <a:p>
             <a:fld id="{9378EDB8-2226-42AB-B4C6-A519D13325D6}" type="datetimeFigureOut">
               <a:rPr lang="en-GB" smtClean="0"/>
-              <a:t>06/01/2020</a:t>
+              <a:t>09/01/2020</a:t>
             </a:fld>
             <a:endParaRPr lang="en-GB"/>
           </a:p>
@@ -408,7 +413,7 @@
           <a:p>
             <a:fld id="{9378EDB8-2226-42AB-B4C6-A519D13325D6}" type="datetimeFigureOut">
               <a:rPr lang="en-GB" smtClean="0"/>
-              <a:t>06/01/2020</a:t>
+              <a:t>09/01/2020</a:t>
             </a:fld>
             <a:endParaRPr lang="en-GB"/>
           </a:p>
@@ -588,7 +593,7 @@
           <a:p>
             <a:fld id="{9378EDB8-2226-42AB-B4C6-A519D13325D6}" type="datetimeFigureOut">
               <a:rPr lang="en-GB" smtClean="0"/>
-              <a:t>06/01/2020</a:t>
+              <a:t>09/01/2020</a:t>
             </a:fld>
             <a:endParaRPr lang="en-GB"/>
           </a:p>
@@ -758,7 +763,7 @@
           <a:p>
             <a:fld id="{9378EDB8-2226-42AB-B4C6-A519D13325D6}" type="datetimeFigureOut">
               <a:rPr lang="en-GB" smtClean="0"/>
-              <a:t>06/01/2020</a:t>
+              <a:t>09/01/2020</a:t>
             </a:fld>
             <a:endParaRPr lang="en-GB"/>
           </a:p>
@@ -1004,7 +1009,7 @@
           <a:p>
             <a:fld id="{9378EDB8-2226-42AB-B4C6-A519D13325D6}" type="datetimeFigureOut">
               <a:rPr lang="en-GB" smtClean="0"/>
-              <a:t>06/01/2020</a:t>
+              <a:t>09/01/2020</a:t>
             </a:fld>
             <a:endParaRPr lang="en-GB"/>
           </a:p>
@@ -1236,7 +1241,7 @@
           <a:p>
             <a:fld id="{9378EDB8-2226-42AB-B4C6-A519D13325D6}" type="datetimeFigureOut">
               <a:rPr lang="en-GB" smtClean="0"/>
-              <a:t>06/01/2020</a:t>
+              <a:t>09/01/2020</a:t>
             </a:fld>
             <a:endParaRPr lang="en-GB"/>
           </a:p>
@@ -1603,7 +1608,7 @@
           <a:p>
             <a:fld id="{9378EDB8-2226-42AB-B4C6-A519D13325D6}" type="datetimeFigureOut">
               <a:rPr lang="en-GB" smtClean="0"/>
-              <a:t>06/01/2020</a:t>
+              <a:t>09/01/2020</a:t>
             </a:fld>
             <a:endParaRPr lang="en-GB"/>
           </a:p>
@@ -1721,7 +1726,7 @@
           <a:p>
             <a:fld id="{9378EDB8-2226-42AB-B4C6-A519D13325D6}" type="datetimeFigureOut">
               <a:rPr lang="en-GB" smtClean="0"/>
-              <a:t>06/01/2020</a:t>
+              <a:t>09/01/2020</a:t>
             </a:fld>
             <a:endParaRPr lang="en-GB"/>
           </a:p>
@@ -1816,7 +1821,7 @@
           <a:p>
             <a:fld id="{9378EDB8-2226-42AB-B4C6-A519D13325D6}" type="datetimeFigureOut">
               <a:rPr lang="en-GB" smtClean="0"/>
-              <a:t>06/01/2020</a:t>
+              <a:t>09/01/2020</a:t>
             </a:fld>
             <a:endParaRPr lang="en-GB"/>
           </a:p>
@@ -2093,7 +2098,7 @@
           <a:p>
             <a:fld id="{9378EDB8-2226-42AB-B4C6-A519D13325D6}" type="datetimeFigureOut">
               <a:rPr lang="en-GB" smtClean="0"/>
-              <a:t>06/01/2020</a:t>
+              <a:t>09/01/2020</a:t>
             </a:fld>
             <a:endParaRPr lang="en-GB"/>
           </a:p>
@@ -2346,7 +2351,7 @@
           <a:p>
             <a:fld id="{9378EDB8-2226-42AB-B4C6-A519D13325D6}" type="datetimeFigureOut">
               <a:rPr lang="en-GB" smtClean="0"/>
-              <a:t>06/01/2020</a:t>
+              <a:t>09/01/2020</a:t>
             </a:fld>
             <a:endParaRPr lang="en-GB"/>
           </a:p>
@@ -2559,7 +2564,7 @@
           <a:p>
             <a:fld id="{9378EDB8-2226-42AB-B4C6-A519D13325D6}" type="datetimeFigureOut">
               <a:rPr lang="en-GB" smtClean="0"/>
-              <a:t>06/01/2020</a:t>
+              <a:t>09/01/2020</a:t>
             </a:fld>
             <a:endParaRPr lang="en-GB"/>
           </a:p>
@@ -3001,7 +3006,7 @@
           <a:p>
             <a:pPr algn="ctr"/>
             <a:r>
-              <a:rPr lang="en-GB" sz="2800" b="1" dirty="0">
+              <a:rPr lang="en-GB" sz="3200" b="1" dirty="0">
                 <a:latin typeface="Arial" panose="020B0604020202020204" pitchFamily="34" charset="0"/>
                 <a:cs typeface="Arial" panose="020B0604020202020204" pitchFamily="34" charset="0"/>
               </a:rPr>
@@ -3011,27 +3016,27 @@
           <a:p>
             <a:pPr algn="ctr"/>
             <a:r>
-              <a:rPr lang="en-GB" dirty="0" smtClean="0">
+              <a:rPr lang="en-GB" sz="2000" dirty="0" smtClean="0">
                 <a:latin typeface="Arial" panose="020B0604020202020204" pitchFamily="34" charset="0"/>
                 <a:cs typeface="Arial" panose="020B0604020202020204" pitchFamily="34" charset="0"/>
               </a:rPr>
               <a:t>(</a:t>
             </a:r>
             <a:r>
-              <a:rPr lang="en-GB" i="1" dirty="0" smtClean="0">
+              <a:rPr lang="en-GB" sz="2000" i="1" dirty="0" smtClean="0">
                 <a:latin typeface="Times New Roman" panose="02020603050405020304" pitchFamily="18" charset="0"/>
                 <a:cs typeface="Times New Roman" panose="02020603050405020304" pitchFamily="18" charset="0"/>
               </a:rPr>
               <a:t>N</a:t>
             </a:r>
             <a:r>
-              <a:rPr lang="en-GB" dirty="0" smtClean="0">
+              <a:rPr lang="en-GB" sz="2000" dirty="0" smtClean="0">
                 <a:latin typeface="Arial" panose="020B0604020202020204" pitchFamily="34" charset="0"/>
                 <a:cs typeface="Arial" panose="020B0604020202020204" pitchFamily="34" charset="0"/>
               </a:rPr>
               <a:t> units)</a:t>
             </a:r>
-            <a:endParaRPr lang="en-GB" dirty="0">
+            <a:endParaRPr lang="en-GB" sz="2000" dirty="0">
               <a:latin typeface="Arial" panose="020B0604020202020204" pitchFamily="34" charset="0"/>
               <a:cs typeface="Arial" panose="020B0604020202020204" pitchFamily="34" charset="0"/>
             </a:endParaRPr>
@@ -3075,7 +3080,7 @@
           <a:p>
             <a:pPr algn="ctr"/>
             <a:r>
-              <a:rPr lang="en-GB" sz="2800" b="1" dirty="0" smtClean="0">
+              <a:rPr lang="en-GB" sz="3200" b="1" dirty="0" smtClean="0">
                 <a:latin typeface="Arial" panose="020B0604020202020204" pitchFamily="34" charset="0"/>
                 <a:cs typeface="Arial" panose="020B0604020202020204" pitchFamily="34" charset="0"/>
               </a:rPr>
@@ -3085,135 +3090,69 @@
           <a:p>
             <a:pPr algn="ctr"/>
             <a:r>
-              <a:rPr lang="en-GB" sz="1600" dirty="0" smtClean="0">
+              <a:rPr lang="en-GB" dirty="0" smtClean="0">
                 <a:latin typeface="Arial" panose="020B0604020202020204" pitchFamily="34" charset="0"/>
                 <a:cs typeface="Arial" panose="020B0604020202020204" pitchFamily="34" charset="0"/>
               </a:rPr>
               <a:t>(</a:t>
             </a:r>
             <a:r>
-              <a:rPr lang="en-GB" sz="1600" i="1" dirty="0" smtClean="0">
+              <a:rPr lang="en-GB" i="1" dirty="0" smtClean="0">
                 <a:latin typeface="Times New Roman" panose="02020603050405020304" pitchFamily="18" charset="0"/>
                 <a:cs typeface="Times New Roman" panose="02020603050405020304" pitchFamily="18" charset="0"/>
               </a:rPr>
               <a:t>n</a:t>
             </a:r>
             <a:r>
-              <a:rPr lang="en-GB" sz="1600" dirty="0" smtClean="0">
+              <a:rPr lang="en-GB" dirty="0" smtClean="0">
                 <a:latin typeface="Arial" panose="020B0604020202020204" pitchFamily="34" charset="0"/>
                 <a:cs typeface="Arial" panose="020B0604020202020204" pitchFamily="34" charset="0"/>
               </a:rPr>
               <a:t> units)</a:t>
             </a:r>
-            <a:endParaRPr lang="en-GB" sz="1600" dirty="0">
+            <a:endParaRPr lang="en-GB" dirty="0">
               <a:latin typeface="Arial" panose="020B0604020202020204" pitchFamily="34" charset="0"/>
               <a:cs typeface="Arial" panose="020B0604020202020204" pitchFamily="34" charset="0"/>
             </a:endParaRPr>
           </a:p>
         </p:txBody>
       </p:sp>
-      <p:sp>
-        <p:nvSpPr>
-          <p:cNvPr id="8" name="Bent Arrow 7"/>
-          <p:cNvSpPr/>
+      <p:cxnSp>
+        <p:nvCxnSpPr>
+          <p:cNvPr id="3" name="Curved Connector 2"/>
+          <p:cNvCxnSpPr>
+            <a:stCxn id="12" idx="0"/>
+            <a:endCxn id="5" idx="0"/>
+          </p:cNvCxnSpPr>
           <p:nvPr/>
-        </p:nvSpPr>
+        </p:nvCxnSpPr>
         <p:spPr>
-          <a:xfrm rot="5400000">
-            <a:off x="6622951" y="2221110"/>
-            <a:ext cx="1571107" cy="2676699"/>
+          <a:xfrm>
+            <a:off x="6831684" y="2570372"/>
+            <a:ext cx="1453814" cy="1583447"/>
           </a:xfrm>
-          <a:prstGeom prst="bentArrow">
-            <a:avLst>
-              <a:gd name="adj1" fmla="val 9127"/>
-              <a:gd name="adj2" fmla="val 11243"/>
-              <a:gd name="adj3" fmla="val 19709"/>
-              <a:gd name="adj4" fmla="val 43750"/>
-            </a:avLst>
+          <a:prstGeom prst="curvedConnector2">
+            <a:avLst/>
           </a:prstGeom>
+          <a:ln w="12700">
+            <a:tailEnd type="triangle" w="lg" len="lg"/>
+          </a:ln>
         </p:spPr>
         <p:style>
-          <a:lnRef idx="2">
-            <a:schemeClr val="accent3">
-              <a:shade val="50000"/>
-            </a:schemeClr>
+          <a:lnRef idx="1">
+            <a:schemeClr val="dk1"/>
           </a:lnRef>
-          <a:fillRef idx="1">
-            <a:schemeClr val="accent3"/>
+          <a:fillRef idx="0">
+            <a:schemeClr val="dk1"/>
           </a:fillRef>
           <a:effectRef idx="0">
-            <a:schemeClr val="accent3"/>
+            <a:schemeClr val="dk1"/>
           </a:effectRef>
           <a:fontRef idx="minor">
-            <a:schemeClr val="lt1"/>
+            <a:schemeClr val="tx1"/>
           </a:fontRef>
         </p:style>
-        <p:txBody>
-          <a:bodyPr rtlCol="0" anchor="ctr"/>
-          <a:lstStyle/>
-          <a:p>
-            <a:pPr algn="ctr"/>
-            <a:endParaRPr lang="en-GB">
-              <a:solidFill>
-                <a:schemeClr val="tx1"/>
-              </a:solidFill>
-              <a:latin typeface="Arial" panose="020B0604020202020204" pitchFamily="34" charset="0"/>
-              <a:cs typeface="Arial" panose="020B0604020202020204" pitchFamily="34" charset="0"/>
-            </a:endParaRPr>
-          </a:p>
-        </p:txBody>
-      </p:sp>
-      <p:sp>
-        <p:nvSpPr>
-          <p:cNvPr id="9" name="Bent Arrow 8"/>
-          <p:cNvSpPr/>
-          <p:nvPr/>
-        </p:nvSpPr>
-        <p:spPr>
-          <a:xfrm rot="16200000">
-            <a:off x="5284601" y="2936005"/>
-            <a:ext cx="1571107" cy="2676699"/>
-          </a:xfrm>
-          <a:prstGeom prst="bentArrow">
-            <a:avLst>
-              <a:gd name="adj1" fmla="val 9127"/>
-              <a:gd name="adj2" fmla="val 11243"/>
-              <a:gd name="adj3" fmla="val 19709"/>
-              <a:gd name="adj4" fmla="val 43750"/>
-            </a:avLst>
-          </a:prstGeom>
-        </p:spPr>
-        <p:style>
-          <a:lnRef idx="2">
-            <a:schemeClr val="accent3">
-              <a:shade val="50000"/>
-            </a:schemeClr>
-          </a:lnRef>
-          <a:fillRef idx="1">
-            <a:schemeClr val="accent3"/>
-          </a:fillRef>
-          <a:effectRef idx="0">
-            <a:schemeClr val="accent3"/>
-          </a:effectRef>
-          <a:fontRef idx="minor">
-            <a:schemeClr val="lt1"/>
-          </a:fontRef>
-        </p:style>
-        <p:txBody>
-          <a:bodyPr rtlCol="0" anchor="ctr"/>
-          <a:lstStyle/>
-          <a:p>
-            <a:pPr algn="ctr"/>
-            <a:endParaRPr lang="en-GB">
-              <a:solidFill>
-                <a:schemeClr val="tx1"/>
-              </a:solidFill>
-              <a:latin typeface="Arial" panose="020B0604020202020204" pitchFamily="34" charset="0"/>
-              <a:cs typeface="Arial" panose="020B0604020202020204" pitchFamily="34" charset="0"/>
-            </a:endParaRPr>
-          </a:p>
-        </p:txBody>
-      </p:sp>
+      </p:cxnSp>
       <p:sp>
         <p:nvSpPr>
           <p:cNvPr id="10" name="Rounded Rectangle 9"/>
@@ -3222,21 +3161,17 @@
         </p:nvSpPr>
         <p:spPr>
           <a:xfrm>
-            <a:off x="7700467" y="3147978"/>
-            <a:ext cx="1736342" cy="448888"/>
+            <a:off x="6676051" y="3075362"/>
+            <a:ext cx="2692391" cy="384063"/>
           </a:xfrm>
           <a:prstGeom prst="roundRect">
             <a:avLst/>
           </a:prstGeom>
           <a:solidFill>
-            <a:schemeClr val="bg1">
-              <a:alpha val="80000"/>
-            </a:schemeClr>
+            <a:schemeClr val="bg1"/>
           </a:solidFill>
           <a:ln>
-            <a:solidFill>
-              <a:schemeClr val="bg1"/>
-            </a:solidFill>
+            <a:noFill/>
           </a:ln>
         </p:spPr>
         <p:style>
@@ -3261,7 +3196,7 @@
           <a:p>
             <a:pPr algn="ctr"/>
             <a:r>
-              <a:rPr lang="en-GB" dirty="0" smtClean="0">
+              <a:rPr lang="en-GB" sz="2000" dirty="0" smtClean="0">
                 <a:solidFill>
                   <a:schemeClr val="tx1"/>
                 </a:solidFill>
@@ -3270,7 +3205,7 @@
               </a:rPr>
               <a:t>Data collection</a:t>
             </a:r>
-            <a:endParaRPr lang="en-GB" dirty="0">
+            <a:endParaRPr lang="en-GB" sz="2000" dirty="0">
               <a:solidFill>
                 <a:schemeClr val="tx1"/>
               </a:solidFill>
@@ -3280,29 +3215,63 @@
           </a:p>
         </p:txBody>
       </p:sp>
-      <p:sp>
-        <p:nvSpPr>
-          <p:cNvPr id="11" name="Rounded Rectangle 10"/>
+      <p:cxnSp>
+        <p:nvCxnSpPr>
+          <p:cNvPr id="16" name="Curved Connector 15"/>
+          <p:cNvCxnSpPr>
+            <a:stCxn id="5" idx="3"/>
+            <a:endCxn id="12" idx="1"/>
+          </p:cNvCxnSpPr>
+          <p:nvPr/>
+        </p:nvCxnSpPr>
+        <p:spPr>
+          <a:xfrm rot="5400000" flipH="1">
+            <a:off x="5401484" y="3304309"/>
+            <a:ext cx="1151193" cy="2988633"/>
+          </a:xfrm>
+          <a:prstGeom prst="curvedConnector3">
+            <a:avLst>
+              <a:gd name="adj1" fmla="val -31547"/>
+            </a:avLst>
+          </a:prstGeom>
+          <a:ln w="12700">
+            <a:tailEnd type="triangle" w="lg" len="lg"/>
+          </a:ln>
+        </p:spPr>
+        <p:style>
+          <a:lnRef idx="1">
+            <a:schemeClr val="dk1"/>
+          </a:lnRef>
+          <a:fillRef idx="0">
+            <a:schemeClr val="dk1"/>
+          </a:fillRef>
+          <a:effectRef idx="0">
+            <a:schemeClr val="dk1"/>
+          </a:effectRef>
+          <a:fontRef idx="minor">
+            <a:schemeClr val="tx1"/>
+          </a:fontRef>
+        </p:style>
+      </p:cxnSp>
+      <p:sp>
+        <p:nvSpPr>
+          <p:cNvPr id="21" name="Rounded Rectangle 20"/>
           <p:cNvSpPr/>
           <p:nvPr/>
         </p:nvSpPr>
         <p:spPr>
           <a:xfrm>
-            <a:off x="4040494" y="4382419"/>
-            <a:ext cx="2496530" cy="448888"/>
+            <a:off x="3483032" y="5030318"/>
+            <a:ext cx="3031401" cy="384063"/>
           </a:xfrm>
           <a:prstGeom prst="roundRect">
             <a:avLst/>
           </a:prstGeom>
           <a:solidFill>
-            <a:schemeClr val="bg1">
-              <a:alpha val="80000"/>
-            </a:schemeClr>
+            <a:schemeClr val="bg1"/>
           </a:solidFill>
           <a:ln>
-            <a:solidFill>
-              <a:schemeClr val="bg1"/>
-            </a:solidFill>
+            <a:noFill/>
           </a:ln>
         </p:spPr>
         <p:style>
@@ -3327,7 +3296,7 @@
           <a:p>
             <a:pPr algn="ctr"/>
             <a:r>
-              <a:rPr lang="en-GB" dirty="0" smtClean="0">
+              <a:rPr lang="en-GB" sz="2000" dirty="0" smtClean="0">
                 <a:solidFill>
                   <a:schemeClr val="tx1"/>
                 </a:solidFill>
@@ -3336,7 +3305,7 @@
               </a:rPr>
               <a:t>Statistical inference</a:t>
             </a:r>
-            <a:endParaRPr lang="en-GB" dirty="0">
+            <a:endParaRPr lang="en-GB" sz="2000" dirty="0">
               <a:solidFill>
                 <a:schemeClr val="tx1"/>
               </a:solidFill>

</xml_diff>

<commit_message>
dapr 1 - wip
</commit_message>
<xml_diff>
--- a/dapr1/dapr1book/images/statistical_inference.pptx
+++ b/dapr1/dapr1book/images/statistical_inference.pptx
@@ -243,7 +243,7 @@
           <a:p>
             <a:fld id="{9378EDB8-2226-42AB-B4C6-A519D13325D6}" type="datetimeFigureOut">
               <a:rPr lang="en-GB" smtClean="0"/>
-              <a:t>09/01/2020</a:t>
+              <a:t>10/01/2020</a:t>
             </a:fld>
             <a:endParaRPr lang="en-GB"/>
           </a:p>
@@ -413,7 +413,7 @@
           <a:p>
             <a:fld id="{9378EDB8-2226-42AB-B4C6-A519D13325D6}" type="datetimeFigureOut">
               <a:rPr lang="en-GB" smtClean="0"/>
-              <a:t>09/01/2020</a:t>
+              <a:t>10/01/2020</a:t>
             </a:fld>
             <a:endParaRPr lang="en-GB"/>
           </a:p>
@@ -593,7 +593,7 @@
           <a:p>
             <a:fld id="{9378EDB8-2226-42AB-B4C6-A519D13325D6}" type="datetimeFigureOut">
               <a:rPr lang="en-GB" smtClean="0"/>
-              <a:t>09/01/2020</a:t>
+              <a:t>10/01/2020</a:t>
             </a:fld>
             <a:endParaRPr lang="en-GB"/>
           </a:p>
@@ -763,7 +763,7 @@
           <a:p>
             <a:fld id="{9378EDB8-2226-42AB-B4C6-A519D13325D6}" type="datetimeFigureOut">
               <a:rPr lang="en-GB" smtClean="0"/>
-              <a:t>09/01/2020</a:t>
+              <a:t>10/01/2020</a:t>
             </a:fld>
             <a:endParaRPr lang="en-GB"/>
           </a:p>
@@ -1009,7 +1009,7 @@
           <a:p>
             <a:fld id="{9378EDB8-2226-42AB-B4C6-A519D13325D6}" type="datetimeFigureOut">
               <a:rPr lang="en-GB" smtClean="0"/>
-              <a:t>09/01/2020</a:t>
+              <a:t>10/01/2020</a:t>
             </a:fld>
             <a:endParaRPr lang="en-GB"/>
           </a:p>
@@ -1241,7 +1241,7 @@
           <a:p>
             <a:fld id="{9378EDB8-2226-42AB-B4C6-A519D13325D6}" type="datetimeFigureOut">
               <a:rPr lang="en-GB" smtClean="0"/>
-              <a:t>09/01/2020</a:t>
+              <a:t>10/01/2020</a:t>
             </a:fld>
             <a:endParaRPr lang="en-GB"/>
           </a:p>
@@ -1608,7 +1608,7 @@
           <a:p>
             <a:fld id="{9378EDB8-2226-42AB-B4C6-A519D13325D6}" type="datetimeFigureOut">
               <a:rPr lang="en-GB" smtClean="0"/>
-              <a:t>09/01/2020</a:t>
+              <a:t>10/01/2020</a:t>
             </a:fld>
             <a:endParaRPr lang="en-GB"/>
           </a:p>
@@ -1726,7 +1726,7 @@
           <a:p>
             <a:fld id="{9378EDB8-2226-42AB-B4C6-A519D13325D6}" type="datetimeFigureOut">
               <a:rPr lang="en-GB" smtClean="0"/>
-              <a:t>09/01/2020</a:t>
+              <a:t>10/01/2020</a:t>
             </a:fld>
             <a:endParaRPr lang="en-GB"/>
           </a:p>
@@ -1821,7 +1821,7 @@
           <a:p>
             <a:fld id="{9378EDB8-2226-42AB-B4C6-A519D13325D6}" type="datetimeFigureOut">
               <a:rPr lang="en-GB" smtClean="0"/>
-              <a:t>09/01/2020</a:t>
+              <a:t>10/01/2020</a:t>
             </a:fld>
             <a:endParaRPr lang="en-GB"/>
           </a:p>
@@ -2098,7 +2098,7 @@
           <a:p>
             <a:fld id="{9378EDB8-2226-42AB-B4C6-A519D13325D6}" type="datetimeFigureOut">
               <a:rPr lang="en-GB" smtClean="0"/>
-              <a:t>09/01/2020</a:t>
+              <a:t>10/01/2020</a:t>
             </a:fld>
             <a:endParaRPr lang="en-GB"/>
           </a:p>
@@ -2351,7 +2351,7 @@
           <a:p>
             <a:fld id="{9378EDB8-2226-42AB-B4C6-A519D13325D6}" type="datetimeFigureOut">
               <a:rPr lang="en-GB" smtClean="0"/>
-              <a:t>09/01/2020</a:t>
+              <a:t>10/01/2020</a:t>
             </a:fld>
             <a:endParaRPr lang="en-GB"/>
           </a:p>
@@ -2564,7 +2564,7 @@
           <a:p>
             <a:fld id="{9378EDB8-2226-42AB-B4C6-A519D13325D6}" type="datetimeFigureOut">
               <a:rPr lang="en-GB" smtClean="0"/>
-              <a:t>09/01/2020</a:t>
+              <a:t>10/01/2020</a:t>
             </a:fld>
             <a:endParaRPr lang="en-GB"/>
           </a:p>
@@ -2986,15 +2986,15 @@
         </p:spPr>
         <p:style>
           <a:lnRef idx="2">
-            <a:schemeClr val="accent2">
+            <a:schemeClr val="accent1">
               <a:shade val="50000"/>
             </a:schemeClr>
           </a:lnRef>
           <a:fillRef idx="1">
-            <a:schemeClr val="accent2"/>
+            <a:schemeClr val="accent1"/>
           </a:fillRef>
           <a:effectRef idx="0">
-            <a:schemeClr val="accent2"/>
+            <a:schemeClr val="accent1"/>
           </a:effectRef>
           <a:fontRef idx="minor">
             <a:schemeClr val="lt1"/>

</xml_diff>